<commit_message>
Error in Bob Alice names fixed
</commit_message>
<xml_diff>
--- a/PKI.pptx
+++ b/PKI.pptx
@@ -3325,7 +3325,7 @@
           <a:p>
             <a:fld id="{9BDF0A01-478E-49C8-877C-D5189583BDF1}" type="datetimeFigureOut">
               <a:rPr lang="en-US" smtClean="0"/>
-              <a:t>11/4/2021</a:t>
+              <a:t>7/13/2023</a:t>
             </a:fld>
             <a:endParaRPr lang="en-US"/>
           </a:p>
@@ -3725,6 +3725,90 @@
           <a:bodyPr/>
           <a:lstStyle/>
           <a:p>
+            <a:endParaRPr lang="LID4096" dirty="0"/>
+          </a:p>
+        </p:txBody>
+      </p:sp>
+      <p:sp>
+        <p:nvSpPr>
+          <p:cNvPr id="4" name="Slide Number Placeholder 3"/>
+          <p:cNvSpPr>
+            <a:spLocks noGrp="1"/>
+          </p:cNvSpPr>
+          <p:nvPr>
+            <p:ph type="sldNum" sz="quarter" idx="5"/>
+          </p:nvPr>
+        </p:nvSpPr>
+        <p:spPr/>
+        <p:txBody>
+          <a:bodyPr/>
+          <a:lstStyle/>
+          <a:p>
+            <a:fld id="{927FAE25-BE3E-44B6-A35D-86FFA78C69C8}" type="slidenum">
+              <a:rPr lang="en-US" smtClean="0"/>
+              <a:t>11</a:t>
+            </a:fld>
+            <a:endParaRPr lang="en-US"/>
+          </a:p>
+        </p:txBody>
+      </p:sp>
+    </p:spTree>
+    <p:extLst>
+      <p:ext uri="{BB962C8B-B14F-4D97-AF65-F5344CB8AC3E}">
+        <p14:creationId xmlns:p14="http://schemas.microsoft.com/office/powerpoint/2010/main" val="1292449120"/>
+      </p:ext>
+    </p:extLst>
+  </p:cSld>
+  <p:clrMapOvr>
+    <a:masterClrMapping/>
+  </p:clrMapOvr>
+</p:notes>
+</file>
+
+<file path=ppt/notesSlides/notesSlide11.xml><?xml version="1.0" encoding="utf-8"?>
+<p:notes xmlns:a="http://schemas.openxmlformats.org/drawingml/2006/main" xmlns:r="http://schemas.openxmlformats.org/officeDocument/2006/relationships" xmlns:p="http://schemas.openxmlformats.org/presentationml/2006/main">
+  <p:cSld>
+    <p:spTree>
+      <p:nvGrpSpPr>
+        <p:cNvPr id="1" name=""/>
+        <p:cNvGrpSpPr/>
+        <p:nvPr/>
+      </p:nvGrpSpPr>
+      <p:grpSpPr>
+        <a:xfrm>
+          <a:off x="0" y="0"/>
+          <a:ext cx="0" cy="0"/>
+          <a:chOff x="0" y="0"/>
+          <a:chExt cx="0" cy="0"/>
+        </a:xfrm>
+      </p:grpSpPr>
+      <p:sp>
+        <p:nvSpPr>
+          <p:cNvPr id="2" name="Slide Image Placeholder 1"/>
+          <p:cNvSpPr>
+            <a:spLocks noGrp="1" noRot="1" noChangeAspect="1"/>
+          </p:cNvSpPr>
+          <p:nvPr>
+            <p:ph type="sldImg"/>
+          </p:nvPr>
+        </p:nvSpPr>
+        <p:spPr/>
+      </p:sp>
+      <p:sp>
+        <p:nvSpPr>
+          <p:cNvPr id="3" name="Notes Placeholder 2"/>
+          <p:cNvSpPr>
+            <a:spLocks noGrp="1"/>
+          </p:cNvSpPr>
+          <p:nvPr>
+            <p:ph type="body" idx="1"/>
+          </p:nvPr>
+        </p:nvSpPr>
+        <p:spPr/>
+        <p:txBody>
+          <a:bodyPr/>
+          <a:lstStyle/>
+          <a:p>
             <a:pPr marL="228600" indent="-228600" algn="r" rtl="1">
               <a:buFont typeface="+mj-lt"/>
               <a:buAutoNum type="arabicPeriod"/>
@@ -5410,7 +5494,7 @@
           <a:p>
             <a:fld id="{B1EBC1F9-9847-4BD5-A0D1-37F36F7412BB}" type="datetimeFigureOut">
               <a:rPr lang="en-US" smtClean="0"/>
-              <a:t>11/4/2021</a:t>
+              <a:t>7/13/2023</a:t>
             </a:fld>
             <a:endParaRPr lang="en-US"/>
           </a:p>
@@ -5608,7 +5692,7 @@
           <a:p>
             <a:fld id="{B1EBC1F9-9847-4BD5-A0D1-37F36F7412BB}" type="datetimeFigureOut">
               <a:rPr lang="en-US" smtClean="0"/>
-              <a:t>11/4/2021</a:t>
+              <a:t>7/13/2023</a:t>
             </a:fld>
             <a:endParaRPr lang="en-US"/>
           </a:p>
@@ -5816,7 +5900,7 @@
           <a:p>
             <a:fld id="{B1EBC1F9-9847-4BD5-A0D1-37F36F7412BB}" type="datetimeFigureOut">
               <a:rPr lang="en-US" smtClean="0"/>
-              <a:t>11/4/2021</a:t>
+              <a:t>7/13/2023</a:t>
             </a:fld>
             <a:endParaRPr lang="en-US"/>
           </a:p>
@@ -6014,7 +6098,7 @@
           <a:p>
             <a:fld id="{B1EBC1F9-9847-4BD5-A0D1-37F36F7412BB}" type="datetimeFigureOut">
               <a:rPr lang="en-US" smtClean="0"/>
-              <a:t>11/4/2021</a:t>
+              <a:t>7/13/2023</a:t>
             </a:fld>
             <a:endParaRPr lang="en-US"/>
           </a:p>
@@ -6289,7 +6373,7 @@
           <a:p>
             <a:fld id="{B1EBC1F9-9847-4BD5-A0D1-37F36F7412BB}" type="datetimeFigureOut">
               <a:rPr lang="en-US" smtClean="0"/>
-              <a:t>11/4/2021</a:t>
+              <a:t>7/13/2023</a:t>
             </a:fld>
             <a:endParaRPr lang="en-US"/>
           </a:p>
@@ -6554,7 +6638,7 @@
           <a:p>
             <a:fld id="{B1EBC1F9-9847-4BD5-A0D1-37F36F7412BB}" type="datetimeFigureOut">
               <a:rPr lang="en-US" smtClean="0"/>
-              <a:t>11/4/2021</a:t>
+              <a:t>7/13/2023</a:t>
             </a:fld>
             <a:endParaRPr lang="en-US"/>
           </a:p>
@@ -6966,7 +7050,7 @@
           <a:p>
             <a:fld id="{B1EBC1F9-9847-4BD5-A0D1-37F36F7412BB}" type="datetimeFigureOut">
               <a:rPr lang="en-US" smtClean="0"/>
-              <a:t>11/4/2021</a:t>
+              <a:t>7/13/2023</a:t>
             </a:fld>
             <a:endParaRPr lang="en-US"/>
           </a:p>
@@ -7107,7 +7191,7 @@
           <a:p>
             <a:fld id="{B1EBC1F9-9847-4BD5-A0D1-37F36F7412BB}" type="datetimeFigureOut">
               <a:rPr lang="en-US" smtClean="0"/>
-              <a:t>11/4/2021</a:t>
+              <a:t>7/13/2023</a:t>
             </a:fld>
             <a:endParaRPr lang="en-US"/>
           </a:p>
@@ -7220,7 +7304,7 @@
           <a:p>
             <a:fld id="{B1EBC1F9-9847-4BD5-A0D1-37F36F7412BB}" type="datetimeFigureOut">
               <a:rPr lang="en-US" smtClean="0"/>
-              <a:t>11/4/2021</a:t>
+              <a:t>7/13/2023</a:t>
             </a:fld>
             <a:endParaRPr lang="en-US"/>
           </a:p>
@@ -7531,7 +7615,7 @@
           <a:p>
             <a:fld id="{B1EBC1F9-9847-4BD5-A0D1-37F36F7412BB}" type="datetimeFigureOut">
               <a:rPr lang="en-US" smtClean="0"/>
-              <a:t>11/4/2021</a:t>
+              <a:t>7/13/2023</a:t>
             </a:fld>
             <a:endParaRPr lang="en-US"/>
           </a:p>
@@ -7819,7 +7903,7 @@
           <a:p>
             <a:fld id="{B1EBC1F9-9847-4BD5-A0D1-37F36F7412BB}" type="datetimeFigureOut">
               <a:rPr lang="en-US" smtClean="0"/>
-              <a:t>11/4/2021</a:t>
+              <a:t>7/13/2023</a:t>
             </a:fld>
             <a:endParaRPr lang="en-US"/>
           </a:p>
@@ -8060,7 +8144,7 @@
           <a:p>
             <a:fld id="{B1EBC1F9-9847-4BD5-A0D1-37F36F7412BB}" type="datetimeFigureOut">
               <a:rPr lang="en-US" smtClean="0"/>
-              <a:t>11/4/2021</a:t>
+              <a:t>7/13/2023</a:t>
             </a:fld>
             <a:endParaRPr lang="en-US"/>
           </a:p>
@@ -8948,7 +9032,7 @@
           <p:nvPr/>
         </p:nvPicPr>
         <p:blipFill>
-          <a:blip r:embed="rId2"/>
+          <a:blip r:embed="rId3"/>
           <a:stretch>
             <a:fillRect/>
           </a:stretch>
@@ -8978,7 +9062,7 @@
           <p:nvPr/>
         </p:nvPicPr>
         <p:blipFill>
-          <a:blip r:embed="rId3"/>
+          <a:blip r:embed="rId4"/>
           <a:stretch>
             <a:fillRect/>
           </a:stretch>
@@ -9008,7 +9092,7 @@
           <p:nvPr/>
         </p:nvPicPr>
         <p:blipFill>
-          <a:blip r:embed="rId4"/>
+          <a:blip r:embed="rId5"/>
           <a:stretch>
             <a:fillRect/>
           </a:stretch>
@@ -9038,7 +9122,7 @@
         <p:spPr>
           <a:xfrm>
             <a:off x="1032450" y="5702084"/>
-            <a:ext cx="1727524" cy="369332"/>
+            <a:ext cx="1644168" cy="369332"/>
           </a:xfrm>
           <a:prstGeom prst="rect">
             <a:avLst/>
@@ -9053,7 +9137,7 @@
           <a:p>
             <a:r>
               <a:rPr lang="en-US" dirty="0"/>
-              <a:t>Alice Private Key</a:t>
+              <a:t>Bob Private Key</a:t>
             </a:r>
           </a:p>
         </p:txBody>
@@ -9073,7 +9157,7 @@
         <p:spPr>
           <a:xfrm>
             <a:off x="1032450" y="6271899"/>
-            <a:ext cx="1642566" cy="369332"/>
+            <a:ext cx="1559209" cy="369332"/>
           </a:xfrm>
           <a:prstGeom prst="rect">
             <a:avLst/>
@@ -9088,7 +9172,7 @@
           <a:p>
             <a:r>
               <a:rPr lang="en-US" dirty="0"/>
-              <a:t>Alice Public Key</a:t>
+              <a:t>Bob Public Key</a:t>
             </a:r>
           </a:p>
         </p:txBody>
@@ -9108,7 +9192,7 @@
           <p:nvPr/>
         </p:nvPicPr>
         <p:blipFill>
-          <a:blip r:embed="rId5"/>
+          <a:blip r:embed="rId6"/>
           <a:stretch>
             <a:fillRect/>
           </a:stretch>
@@ -9138,7 +9222,7 @@
           <p:nvPr/>
         </p:nvPicPr>
         <p:blipFill>
-          <a:blip r:embed="rId6"/>
+          <a:blip r:embed="rId7"/>
           <a:stretch>
             <a:fillRect/>
           </a:stretch>
@@ -9168,7 +9252,7 @@
           <p:nvPr/>
         </p:nvPicPr>
         <p:blipFill>
-          <a:blip r:embed="rId7">
+          <a:blip r:embed="rId8">
             <a:extLst>
               <a:ext uri="{28A0092B-C50C-407E-A947-70E740481C1C}">
                 <a14:useLocalDpi xmlns:a14="http://schemas.microsoft.com/office/drawing/2010/main" val="0"/>
@@ -9239,7 +9323,7 @@
           <p:nvPr/>
         </p:nvPicPr>
         <p:blipFill>
-          <a:blip r:embed="rId7">
+          <a:blip r:embed="rId8">
             <a:extLst>
               <a:ext uri="{28A0092B-C50C-407E-A947-70E740481C1C}">
                 <a14:useLocalDpi xmlns:a14="http://schemas.microsoft.com/office/drawing/2010/main" val="0"/>
@@ -9275,7 +9359,7 @@
           <p:nvPr/>
         </p:nvPicPr>
         <p:blipFill>
-          <a:blip r:embed="rId7">
+          <a:blip r:embed="rId8">
             <a:extLst>
               <a:ext uri="{28A0092B-C50C-407E-A947-70E740481C1C}">
                 <a14:useLocalDpi xmlns:a14="http://schemas.microsoft.com/office/drawing/2010/main" val="0"/>
@@ -9311,7 +9395,7 @@
           <p:nvPr/>
         </p:nvPicPr>
         <p:blipFill>
-          <a:blip r:embed="rId5"/>
+          <a:blip r:embed="rId6"/>
           <a:stretch>
             <a:fillRect/>
           </a:stretch>
@@ -9341,7 +9425,7 @@
           <p:nvPr/>
         </p:nvPicPr>
         <p:blipFill>
-          <a:blip r:embed="rId4"/>
+          <a:blip r:embed="rId5"/>
           <a:stretch>
             <a:fillRect/>
           </a:stretch>
@@ -9371,7 +9455,7 @@
           <p:nvPr/>
         </p:nvPicPr>
         <p:blipFill>
-          <a:blip r:embed="rId8"/>
+          <a:blip r:embed="rId9"/>
           <a:stretch>
             <a:fillRect/>
           </a:stretch>
@@ -9436,7 +9520,7 @@
           <p:nvPr/>
         </p:nvPicPr>
         <p:blipFill>
-          <a:blip r:embed="rId9"/>
+          <a:blip r:embed="rId10"/>
           <a:stretch>
             <a:fillRect/>
           </a:stretch>
@@ -9466,7 +9550,7 @@
           <p:nvPr/>
         </p:nvPicPr>
         <p:blipFill>
-          <a:blip r:embed="rId10"/>
+          <a:blip r:embed="rId11"/>
           <a:stretch>
             <a:fillRect/>
           </a:stretch>
@@ -9496,7 +9580,7 @@
           <p:nvPr/>
         </p:nvPicPr>
         <p:blipFill>
-          <a:blip r:embed="rId11"/>
+          <a:blip r:embed="rId12"/>
           <a:stretch>
             <a:fillRect/>
           </a:stretch>
@@ -9526,7 +9610,7 @@
           <p:nvPr/>
         </p:nvPicPr>
         <p:blipFill>
-          <a:blip r:embed="rId7">
+          <a:blip r:embed="rId8">
             <a:extLst>
               <a:ext uri="{28A0092B-C50C-407E-A947-70E740481C1C}">
                 <a14:useLocalDpi xmlns:a14="http://schemas.microsoft.com/office/drawing/2010/main" val="0"/>
@@ -9562,7 +9646,7 @@
           <p:nvPr/>
         </p:nvPicPr>
         <p:blipFill>
-          <a:blip r:embed="rId6"/>
+          <a:blip r:embed="rId7"/>
           <a:stretch>
             <a:fillRect/>
           </a:stretch>
@@ -9592,7 +9676,7 @@
           <p:nvPr/>
         </p:nvPicPr>
         <p:blipFill>
-          <a:blip r:embed="rId7">
+          <a:blip r:embed="rId8">
             <a:extLst>
               <a:ext uri="{28A0092B-C50C-407E-A947-70E740481C1C}">
                 <a14:useLocalDpi xmlns:a14="http://schemas.microsoft.com/office/drawing/2010/main" val="0"/>
@@ -9628,7 +9712,7 @@
           <p:nvPr/>
         </p:nvPicPr>
         <p:blipFill>
-          <a:blip r:embed="rId3"/>
+          <a:blip r:embed="rId4"/>
           <a:stretch>
             <a:fillRect/>
           </a:stretch>
@@ -9705,7 +9789,7 @@
           <p:nvPr/>
         </p:nvPicPr>
         <p:blipFill>
-          <a:blip r:embed="rId10"/>
+          <a:blip r:embed="rId11"/>
           <a:stretch>
             <a:fillRect/>
           </a:stretch>
@@ -16541,4 +16625,10 @@
     </a:ext>
   </a:extLst>
 </a:theme>
+</file>
+
+<file path=docMetadata/LabelInfo.xml><?xml version="1.0" encoding="utf-8"?>
+<clbl:labelList xmlns:clbl="http://schemas.microsoft.com/office/2020/mipLabelMetadata">
+  <clbl:label id="{f42aa342-8706-4288-bd11-ebb85995028c}" enabled="1" method="Standard" siteId="{72f988bf-86f1-41af-91ab-2d7cd011db47}" contentBits="0" removed="0"/>
+</clbl:labelList>
 </file>
</xml_diff>